<commit_message>
Name changes on slides
</commit_message>
<xml_diff>
--- a/02-Principles.pptx
+++ b/02-Principles.pptx
@@ -5,10 +5,10 @@
     <p:sldMasterId id="2147484014" r:id="rId1"/>
   </p:sldMasterIdLst>
   <p:notesMasterIdLst>
-    <p:notesMasterId r:id="rId20"/>
+    <p:notesMasterId r:id="rId19"/>
   </p:notesMasterIdLst>
   <p:handoutMasterIdLst>
-    <p:handoutMasterId r:id="rId21"/>
+    <p:handoutMasterId r:id="rId20"/>
   </p:handoutMasterIdLst>
   <p:sldIdLst>
     <p:sldId id="261" r:id="rId2"/>
@@ -28,7 +28,6 @@
     <p:sldId id="276" r:id="rId16"/>
     <p:sldId id="277" r:id="rId17"/>
     <p:sldId id="278" r:id="rId18"/>
-    <p:sldId id="279" r:id="rId19"/>
   </p:sldIdLst>
   <p:sldSz cx="9144000" cy="5143500" type="screen16x9"/>
   <p:notesSz cx="6858000" cy="9144000"/>
@@ -159,7 +158,7 @@
   </p:defaultTextStyle>
   <p:extLst>
     <p:ext uri="{EFAFB233-063F-42B5-8137-9DF3F51BA10A}">
-      <p15:sldGuideLst xmlns:p15="http://schemas.microsoft.com/office/powerpoint/2012/main" xmlns="">
+      <p15:sldGuideLst xmlns="" xmlns:p15="http://schemas.microsoft.com/office/powerpoint/2012/main">
         <p15:guide id="1" orient="horz" pos="2160">
           <p15:clr>
             <a:srgbClr val="A4A3A4"/>
@@ -8222,20 +8221,20 @@
           </a:bodyPr>
           <a:lstStyle/>
           <a:p>
-            <a:pPr eaLnBrk="1" hangingPunct="1">
+            <a:pPr>
               <a:defRPr/>
             </a:pPr>
             <a:r>
-              <a:rPr lang="en-US" dirty="0" smtClean="0">
+              <a:rPr lang="en-US" dirty="0">
                 <a:latin typeface="News Gothic Com Thin" charset="0"/>
               </a:rPr>
-              <a:t>Brendan Enrick | @</a:t>
-            </a:r>
-            <a:r>
-              <a:rPr lang="en-US" dirty="0" err="1" smtClean="0">
+              <a:t>Jeff Valore | @</a:t>
+            </a:r>
+            <a:r>
+              <a:rPr lang="en-US" dirty="0" err="1">
                 <a:latin typeface="News Gothic Com Thin" charset="0"/>
               </a:rPr>
-              <a:t>brendoneus</a:t>
+              <a:t>CodingWithSpike</a:t>
             </a:r>
             <a:endParaRPr lang="en-US" dirty="0">
               <a:latin typeface="News Gothic Com Thin" charset="0"/>
@@ -8424,10 +8423,22 @@
               <a:defRPr/>
             </a:pPr>
             <a:r>
-              <a:rPr lang="en-US" smtClean="0">
+              <a:rPr lang="en-US" dirty="0" smtClean="0">
                 <a:latin typeface="News Gothic Com Thin" charset="0"/>
               </a:rPr>
-              <a:t>Steve Smith | @ardalis</a:t>
+              <a:t>Brendan </a:t>
+            </a:r>
+            <a:r>
+              <a:rPr lang="en-US" dirty="0">
+                <a:latin typeface="News Gothic Com Thin" charset="0"/>
+              </a:rPr>
+              <a:t>Enrick | @</a:t>
+            </a:r>
+            <a:r>
+              <a:rPr lang="en-US" dirty="0" err="1" smtClean="0">
+                <a:latin typeface="News Gothic Com Thin" charset="0"/>
+              </a:rPr>
+              <a:t>brendoneus</a:t>
             </a:r>
             <a:endParaRPr lang="en-US" dirty="0">
               <a:latin typeface="News Gothic Com Thin" charset="0"/>
@@ -11337,7 +11348,9 @@
         </p:nvSpPr>
         <p:spPr/>
         <p:txBody>
-          <a:bodyPr/>
+          <a:bodyPr>
+            <a:normAutofit lnSpcReduction="10000"/>
+          </a:bodyPr>
           <a:lstStyle/>
           <a:p>
             <a:pPr eaLnBrk="1" hangingPunct="1"/>
@@ -11786,217 +11799,6 @@
 </p:sld>
 </file>
 
-<file path=ppt/slides/slide18.xml><?xml version="1.0" encoding="utf-8"?>
-<p:sld xmlns:a="http://schemas.openxmlformats.org/drawingml/2006/main" xmlns:r="http://schemas.openxmlformats.org/officeDocument/2006/relationships" xmlns:p="http://schemas.openxmlformats.org/presentationml/2006/main">
-  <p:cSld>
-    <p:spTree>
-      <p:nvGrpSpPr>
-        <p:cNvPr id="1" name=""/>
-        <p:cNvGrpSpPr/>
-        <p:nvPr/>
-      </p:nvGrpSpPr>
-      <p:grpSpPr>
-        <a:xfrm>
-          <a:off x="0" y="0"/>
-          <a:ext cx="0" cy="0"/>
-          <a:chOff x="0" y="0"/>
-          <a:chExt cx="0" cy="0"/>
-        </a:xfrm>
-      </p:grpSpPr>
-      <p:sp>
-        <p:nvSpPr>
-          <p:cNvPr id="4" name="Title 3"/>
-          <p:cNvSpPr>
-            <a:spLocks noGrp="1"/>
-          </p:cNvSpPr>
-          <p:nvPr>
-            <p:ph type="title"/>
-          </p:nvPr>
-        </p:nvSpPr>
-        <p:spPr/>
-        <p:txBody>
-          <a:bodyPr/>
-          <a:lstStyle/>
-          <a:p>
-            <a:r>
-              <a:rPr lang="en-US" dirty="0" smtClean="0"/>
-              <a:t>Thank you!</a:t>
-            </a:r>
-            <a:endParaRPr lang="en-US" dirty="0"/>
-          </a:p>
-        </p:txBody>
-      </p:sp>
-      <p:sp>
-        <p:nvSpPr>
-          <p:cNvPr id="6" name="Content Placeholder 5"/>
-          <p:cNvSpPr>
-            <a:spLocks noGrp="1"/>
-          </p:cNvSpPr>
-          <p:nvPr>
-            <p:ph sz="half" idx="1"/>
-          </p:nvPr>
-        </p:nvSpPr>
-        <p:spPr/>
-        <p:txBody>
-          <a:bodyPr>
-            <a:normAutofit fontScale="92500" lnSpcReduction="10000"/>
-          </a:bodyPr>
-          <a:lstStyle/>
-          <a:p>
-            <a:pPr marL="0" indent="0">
-              <a:buNone/>
-            </a:pPr>
-            <a:r>
-              <a:rPr lang="en-US" dirty="0" smtClean="0"/>
-              <a:t>Brendan Enrick</a:t>
-            </a:r>
-          </a:p>
-          <a:p>
-            <a:pPr marL="0" indent="0">
-              <a:buNone/>
-            </a:pPr>
-            <a:endParaRPr lang="en-US" dirty="0" smtClean="0"/>
-          </a:p>
-          <a:p>
-            <a:pPr marL="0" indent="0">
-              <a:buNone/>
-            </a:pPr>
-            <a:r>
-              <a:rPr lang="en-US" dirty="0" smtClean="0"/>
-              <a:t>@</a:t>
-            </a:r>
-            <a:r>
-              <a:rPr lang="en-US" dirty="0" err="1"/>
-              <a:t>b</a:t>
-            </a:r>
-            <a:r>
-              <a:rPr lang="en-US" dirty="0" err="1" smtClean="0"/>
-              <a:t>rendoneus</a:t>
-            </a:r>
-            <a:endParaRPr lang="en-US" dirty="0"/>
-          </a:p>
-          <a:p>
-            <a:pPr marL="0" indent="0">
-              <a:buNone/>
-            </a:pPr>
-            <a:r>
-              <a:rPr lang="en-US" dirty="0" err="1" smtClean="0"/>
-              <a:t>brendan.enrick.com</a:t>
-            </a:r>
-            <a:endParaRPr lang="en-US" dirty="0"/>
-          </a:p>
-        </p:txBody>
-      </p:sp>
-      <p:sp>
-        <p:nvSpPr>
-          <p:cNvPr id="7" name="Content Placeholder 6"/>
-          <p:cNvSpPr>
-            <a:spLocks noGrp="1"/>
-          </p:cNvSpPr>
-          <p:nvPr>
-            <p:ph sz="half" idx="2"/>
-          </p:nvPr>
-        </p:nvSpPr>
-        <p:spPr/>
-        <p:txBody>
-          <a:bodyPr>
-            <a:normAutofit fontScale="92500" lnSpcReduction="10000"/>
-          </a:bodyPr>
-          <a:lstStyle/>
-          <a:p>
-            <a:pPr marL="0" indent="0">
-              <a:buNone/>
-            </a:pPr>
-            <a:r>
-              <a:rPr lang="en-US" dirty="0" smtClean="0"/>
-              <a:t>Steve Smith</a:t>
-            </a:r>
-          </a:p>
-          <a:p>
-            <a:pPr marL="0" indent="0">
-              <a:buNone/>
-            </a:pPr>
-            <a:endParaRPr lang="en-US" dirty="0"/>
-          </a:p>
-          <a:p>
-            <a:pPr marL="0" indent="0">
-              <a:buNone/>
-            </a:pPr>
-            <a:r>
-              <a:rPr lang="en-US" dirty="0" smtClean="0"/>
-              <a:t>@</a:t>
-            </a:r>
-            <a:r>
-              <a:rPr lang="en-US" dirty="0" err="1" smtClean="0"/>
-              <a:t>ardalis</a:t>
-            </a:r>
-            <a:endParaRPr lang="en-US" dirty="0" smtClean="0"/>
-          </a:p>
-          <a:p>
-            <a:pPr marL="0" indent="0">
-              <a:buNone/>
-            </a:pPr>
-            <a:r>
-              <a:rPr lang="en-US" dirty="0" err="1" smtClean="0"/>
-              <a:t>ardalis.com</a:t>
-            </a:r>
-            <a:endParaRPr lang="en-US" dirty="0" smtClean="0"/>
-          </a:p>
-          <a:p>
-            <a:pPr marL="0" indent="0">
-              <a:buNone/>
-            </a:pPr>
-            <a:endParaRPr lang="en-US" dirty="0"/>
-          </a:p>
-          <a:p>
-            <a:pPr marL="0" indent="0">
-              <a:buNone/>
-            </a:pPr>
-            <a:r>
-              <a:rPr lang="en-US" dirty="0" smtClean="0"/>
-              <a:t>http://</a:t>
-            </a:r>
-            <a:r>
-              <a:rPr lang="en-US" dirty="0" err="1" smtClean="0"/>
-              <a:t>pluralsight.com</a:t>
-            </a:r>
-            <a:r>
-              <a:rPr lang="en-US" dirty="0" smtClean="0"/>
-              <a:t>/training/Authors/Details/</a:t>
-            </a:r>
-            <a:r>
-              <a:rPr lang="en-US" dirty="0" err="1" smtClean="0"/>
-              <a:t>steve</a:t>
-            </a:r>
-            <a:r>
-              <a:rPr lang="en-US" dirty="0" smtClean="0"/>
-              <a:t>-smith</a:t>
-            </a:r>
-            <a:endParaRPr lang="en-US" dirty="0" smtClean="0">
-              <a:ea typeface="+mn-ea"/>
-            </a:endParaRPr>
-          </a:p>
-          <a:p>
-            <a:pPr marL="0" indent="0">
-              <a:buNone/>
-            </a:pPr>
-            <a:endParaRPr lang="en-US" dirty="0"/>
-          </a:p>
-        </p:txBody>
-      </p:sp>
-    </p:spTree>
-    <p:extLst>
-      <p:ext uri="{BB962C8B-B14F-4D97-AF65-F5344CB8AC3E}">
-        <p14:creationId xmlns:p14="http://schemas.microsoft.com/office/powerpoint/2010/main" val="3339218150"/>
-      </p:ext>
-    </p:extLst>
-  </p:cSld>
-  <p:clrMapOvr>
-    <a:masterClrMapping/>
-  </p:clrMapOvr>
-</p:sld>
-</file>
-
 <file path=ppt/slides/slide2.xml><?xml version="1.0" encoding="utf-8"?>
 <p:sld xmlns:a="http://schemas.openxmlformats.org/drawingml/2006/main" xmlns:r="http://schemas.openxmlformats.org/officeDocument/2006/relationships" xmlns:p="http://schemas.openxmlformats.org/presentationml/2006/main">
   <p:cSld>
@@ -12031,7 +11833,7 @@
           <a:p>
             <a:pPr eaLnBrk="1" hangingPunct="1"/>
             <a:r>
-              <a:rPr lang="en-US" smtClean="0">
+              <a:rPr lang="en-US" dirty="0" smtClean="0">
                 <a:latin typeface="News Gothic Com Thin" panose="020B0204030503020204" pitchFamily="34" charset="0"/>
                 <a:cs typeface="News Gothic Com Thin" panose="020B0204030503020204" pitchFamily="34" charset="0"/>
               </a:rPr>
@@ -12064,7 +11866,7 @@
           <a:p>
             <a:pPr eaLnBrk="1" hangingPunct="1"/>
             <a:r>
-              <a:rPr lang="en-US" sz="2400" smtClean="0">
+              <a:rPr lang="en-US" sz="2400" dirty="0" smtClean="0">
                 <a:latin typeface="News Gothic Com Thin" panose="020B0204030503020204" pitchFamily="34" charset="0"/>
                 <a:cs typeface="News Gothic Com Thin" panose="020B0204030503020204" pitchFamily="34" charset="0"/>
               </a:rPr>
@@ -12074,17 +11876,21 @@
           <a:p>
             <a:pPr eaLnBrk="1" hangingPunct="1"/>
             <a:r>
-              <a:rPr lang="en-US" sz="2400" smtClean="0">
+              <a:rPr lang="en-US" sz="2400" dirty="0" smtClean="0">
                 <a:latin typeface="News Gothic Com Thin" panose="020B0204030503020204" pitchFamily="34" charset="0"/>
                 <a:cs typeface="News Gothic Com Thin" panose="020B0204030503020204" pitchFamily="34" charset="0"/>
               </a:rPr>
               <a:t>YAGNI</a:t>
             </a:r>
+            <a:endParaRPr lang="en-US" sz="2400" dirty="0" smtClean="0">
+              <a:latin typeface="News Gothic Com Thin" panose="020B0204030503020204" pitchFamily="34" charset="0"/>
+              <a:cs typeface="News Gothic Com Thin" panose="020B0204030503020204" pitchFamily="34" charset="0"/>
+            </a:endParaRPr>
           </a:p>
           <a:p>
             <a:pPr eaLnBrk="1" hangingPunct="1"/>
             <a:r>
-              <a:rPr lang="en-US" sz="2400" smtClean="0">
+              <a:rPr lang="en-US" sz="2400" dirty="0" smtClean="0">
                 <a:latin typeface="News Gothic Com Thin" panose="020B0204030503020204" pitchFamily="34" charset="0"/>
                 <a:cs typeface="News Gothic Com Thin" panose="020B0204030503020204" pitchFamily="34" charset="0"/>
               </a:rPr>
@@ -12094,7 +11900,7 @@
           <a:p>
             <a:pPr eaLnBrk="1" hangingPunct="1"/>
             <a:r>
-              <a:rPr lang="en-US" sz="2400" smtClean="0">
+              <a:rPr lang="en-US" sz="2400" dirty="0" smtClean="0">
                 <a:latin typeface="News Gothic Com Thin" panose="020B0204030503020204" pitchFamily="34" charset="0"/>
                 <a:cs typeface="News Gothic Com Thin" panose="020B0204030503020204" pitchFamily="34" charset="0"/>
               </a:rPr>
@@ -12104,7 +11910,7 @@
           <a:p>
             <a:pPr eaLnBrk="1" hangingPunct="1"/>
             <a:r>
-              <a:rPr lang="en-US" sz="2400" smtClean="0">
+              <a:rPr lang="en-US" sz="2400" dirty="0" smtClean="0">
                 <a:latin typeface="News Gothic Com Thin" panose="020B0204030503020204" pitchFamily="34" charset="0"/>
                 <a:cs typeface="News Gothic Com Thin" panose="020B0204030503020204" pitchFamily="34" charset="0"/>
               </a:rPr>
@@ -12113,14 +11919,14 @@
           </a:p>
           <a:p>
             <a:pPr eaLnBrk="1" hangingPunct="1"/>
-            <a:endParaRPr lang="en-US" sz="2400" smtClean="0">
+            <a:endParaRPr lang="en-US" sz="2400" dirty="0" smtClean="0">
               <a:latin typeface="News Gothic Com Thin" panose="020B0204030503020204" pitchFamily="34" charset="0"/>
               <a:cs typeface="News Gothic Com Thin" panose="020B0204030503020204" pitchFamily="34" charset="0"/>
             </a:endParaRPr>
           </a:p>
           <a:p>
             <a:pPr eaLnBrk="1" hangingPunct="1"/>
-            <a:endParaRPr lang="en-US" sz="2400" smtClean="0">
+            <a:endParaRPr lang="en-US" sz="2400" dirty="0" smtClean="0">
               <a:latin typeface="News Gothic Com Thin" panose="020B0204030503020204" pitchFamily="34" charset="0"/>
               <a:cs typeface="News Gothic Com Thin" panose="020B0204030503020204" pitchFamily="34" charset="0"/>
             </a:endParaRPr>
@@ -12151,17 +11957,28 @@
           <a:p>
             <a:pPr eaLnBrk="1" hangingPunct="1"/>
             <a:r>
-              <a:rPr lang="en-US" sz="2400" smtClean="0">
+              <a:rPr lang="en-US" sz="2400" dirty="0" smtClean="0">
                 <a:latin typeface="News Gothic Com Thin" panose="020B0204030503020204" pitchFamily="34" charset="0"/>
                 <a:cs typeface="News Gothic Com Thin" panose="020B0204030503020204" pitchFamily="34" charset="0"/>
               </a:rPr>
-              <a:t>Single Reponsibility</a:t>
-            </a:r>
+              <a:t>Single </a:t>
+            </a:r>
+            <a:r>
+              <a:rPr lang="en-US" sz="2400" dirty="0" err="1" smtClean="0">
+                <a:latin typeface="News Gothic Com Thin" panose="020B0204030503020204" pitchFamily="34" charset="0"/>
+                <a:cs typeface="News Gothic Com Thin" panose="020B0204030503020204" pitchFamily="34" charset="0"/>
+              </a:rPr>
+              <a:t>Reponsibility</a:t>
+            </a:r>
+            <a:endParaRPr lang="en-US" sz="2400" dirty="0" smtClean="0">
+              <a:latin typeface="News Gothic Com Thin" panose="020B0204030503020204" pitchFamily="34" charset="0"/>
+              <a:cs typeface="News Gothic Com Thin" panose="020B0204030503020204" pitchFamily="34" charset="0"/>
+            </a:endParaRPr>
           </a:p>
           <a:p>
             <a:pPr eaLnBrk="1" hangingPunct="1"/>
             <a:r>
-              <a:rPr lang="en-US" sz="2400" smtClean="0">
+              <a:rPr lang="en-US" sz="2400" dirty="0" smtClean="0">
                 <a:latin typeface="News Gothic Com Thin" panose="020B0204030503020204" pitchFamily="34" charset="0"/>
                 <a:cs typeface="News Gothic Com Thin" panose="020B0204030503020204" pitchFamily="34" charset="0"/>
               </a:rPr>
@@ -12171,17 +11988,24 @@
           <a:p>
             <a:pPr eaLnBrk="1" hangingPunct="1"/>
             <a:r>
-              <a:rPr lang="en-US" sz="2400" smtClean="0">
+              <a:rPr lang="en-US" sz="2400" dirty="0" err="1" smtClean="0">
                 <a:latin typeface="News Gothic Com Thin" panose="020B0204030503020204" pitchFamily="34" charset="0"/>
                 <a:cs typeface="News Gothic Com Thin" panose="020B0204030503020204" pitchFamily="34" charset="0"/>
               </a:rPr>
-              <a:t>Liskov Substitution</a:t>
+              <a:t>Liskov</a:t>
+            </a:r>
+            <a:r>
+              <a:rPr lang="en-US" sz="2400" dirty="0" smtClean="0">
+                <a:latin typeface="News Gothic Com Thin" panose="020B0204030503020204" pitchFamily="34" charset="0"/>
+                <a:cs typeface="News Gothic Com Thin" panose="020B0204030503020204" pitchFamily="34" charset="0"/>
+              </a:rPr>
+              <a:t> Substitution</a:t>
             </a:r>
           </a:p>
           <a:p>
             <a:pPr eaLnBrk="1" hangingPunct="1"/>
             <a:r>
-              <a:rPr lang="en-US" sz="2400" smtClean="0">
+              <a:rPr lang="en-US" sz="2400" dirty="0" smtClean="0">
                 <a:latin typeface="News Gothic Com Thin" panose="020B0204030503020204" pitchFamily="34" charset="0"/>
                 <a:cs typeface="News Gothic Com Thin" panose="020B0204030503020204" pitchFamily="34" charset="0"/>
               </a:rPr>
@@ -12191,7 +12015,7 @@
           <a:p>
             <a:pPr eaLnBrk="1" hangingPunct="1"/>
             <a:r>
-              <a:rPr lang="en-US" sz="2400" smtClean="0">
+              <a:rPr lang="en-US" sz="2400" dirty="0" smtClean="0">
                 <a:latin typeface="News Gothic Com Thin" panose="020B0204030503020204" pitchFamily="34" charset="0"/>
                 <a:cs typeface="News Gothic Com Thin" panose="020B0204030503020204" pitchFamily="34" charset="0"/>
               </a:rPr>
@@ -12201,16 +12025,23 @@
           <a:p>
             <a:pPr eaLnBrk="1" hangingPunct="1"/>
             <a:r>
-              <a:rPr lang="en-US" sz="2400" smtClean="0">
+              <a:rPr lang="en-US" sz="2400" dirty="0" smtClean="0">
                 <a:latin typeface="News Gothic Com Thin" panose="020B0204030503020204" pitchFamily="34" charset="0"/>
                 <a:cs typeface="News Gothic Com Thin" panose="020B0204030503020204" pitchFamily="34" charset="0"/>
               </a:rPr>
-              <a:t>Don’t Repeat Yourself</a:t>
+              <a:t>Don’t </a:t>
+            </a:r>
+            <a:r>
+              <a:rPr lang="en-US" sz="2400" dirty="0" smtClean="0">
+                <a:latin typeface="News Gothic Com Thin" panose="020B0204030503020204" pitchFamily="34" charset="0"/>
+                <a:cs typeface="News Gothic Com Thin" panose="020B0204030503020204" pitchFamily="34" charset="0"/>
+              </a:rPr>
+              <a:t>Repeat Yourself</a:t>
             </a:r>
           </a:p>
           <a:p>
             <a:pPr eaLnBrk="1" hangingPunct="1"/>
-            <a:endParaRPr lang="en-US" sz="2400" smtClean="0">
+            <a:endParaRPr lang="en-US" sz="2400" dirty="0" smtClean="0">
               <a:latin typeface="News Gothic Com Thin" panose="020B0204030503020204" pitchFamily="34" charset="0"/>
               <a:cs typeface="News Gothic Com Thin" panose="020B0204030503020204" pitchFamily="34" charset="0"/>
             </a:endParaRPr>

</xml_diff>

<commit_message>
Change img sizes and fix quotes
</commit_message>
<xml_diff>
--- a/02-Principles.pptx
+++ b/02-Principles.pptx
@@ -158,7 +158,7 @@
   </p:defaultTextStyle>
   <p:extLst>
     <p:ext uri="{EFAFB233-063F-42B5-8137-9DF3F51BA10A}">
-      <p15:sldGuideLst xmlns="" xmlns:p15="http://schemas.microsoft.com/office/powerpoint/2012/main">
+      <p15:sldGuideLst xmlns:p15="http://schemas.microsoft.com/office/powerpoint/2012/main" xmlns="">
         <p15:guide id="1" orient="horz" pos="2160">
           <p15:clr>
             <a:srgbClr val="A4A3A4"/>
@@ -8211,8 +8211,8 @@
         </p:nvSpPr>
         <p:spPr>
           <a:xfrm>
-            <a:off x="1371600" y="3563541"/>
-            <a:ext cx="6859588" cy="339328"/>
+            <a:off x="0" y="3563541"/>
+            <a:ext cx="9144000" cy="339328"/>
           </a:xfrm>
         </p:spPr>
         <p:txBody>
@@ -8252,8 +8252,8 @@
         </p:nvSpPr>
         <p:spPr>
           <a:xfrm>
-            <a:off x="1371600" y="3893379"/>
-            <a:ext cx="6859588" cy="339328"/>
+            <a:off x="0" y="3893379"/>
+            <a:ext cx="9144000" cy="339328"/>
           </a:xfrm>
           <a:prstGeom prst="rect">
             <a:avLst/>
@@ -8652,8 +8652,8 @@
         </p:blipFill>
         <p:spPr bwMode="auto">
           <a:xfrm>
-            <a:off x="5353050" y="1434703"/>
-            <a:ext cx="3333750" cy="2500313"/>
+            <a:off x="5138928" y="1138428"/>
+            <a:ext cx="4005072" cy="4005072"/>
           </a:xfrm>
           <a:prstGeom prst="rect">
             <a:avLst/>
@@ -9277,7 +9277,7 @@
           <a:p>
             <a:pPr eaLnBrk="1" hangingPunct="1"/>
             <a:r>
-              <a:rPr lang="en-US" sz="1800" smtClean="0">
+              <a:rPr lang="en-US" sz="1800" dirty="0" smtClean="0">
                 <a:latin typeface="News Gothic Com Thin" panose="020B0204030503020204" pitchFamily="34" charset="0"/>
                 <a:cs typeface="News Gothic Com Thin" panose="020B0204030503020204" pitchFamily="34" charset="0"/>
               </a:rPr>
@@ -9286,7 +9286,7 @@
           </a:p>
           <a:p>
             <a:pPr eaLnBrk="1" hangingPunct="1"/>
-            <a:endParaRPr lang="en-US" sz="1800" smtClean="0">
+            <a:endParaRPr lang="en-US" sz="1800" dirty="0" smtClean="0">
               <a:latin typeface="News Gothic Com Thin" panose="020B0204030503020204" pitchFamily="34" charset="0"/>
               <a:cs typeface="News Gothic Com Thin" panose="020B0204030503020204" pitchFamily="34" charset="0"/>
             </a:endParaRPr>
@@ -9294,16 +9294,30 @@
           <a:p>
             <a:pPr eaLnBrk="1" hangingPunct="1"/>
             <a:r>
-              <a:rPr lang="en-US" sz="1800" smtClean="0">
+              <a:rPr lang="en-US" sz="1800" dirty="0" smtClean="0">
                 <a:latin typeface="News Gothic Com Thin" panose="020B0204030503020204" pitchFamily="34" charset="0"/>
                 <a:cs typeface="News Gothic Com Thin" panose="020B0204030503020204" pitchFamily="34" charset="0"/>
               </a:rPr>
-              <a:t>Clients should be able to change the entity’s behavior</a:t>
+              <a:t>Clients should be able to change the </a:t>
+            </a:r>
+            <a:r>
+              <a:rPr lang="en-US" sz="1800" dirty="0" smtClean="0">
+                <a:latin typeface="News Gothic Com Thin" panose="020B0204030503020204" pitchFamily="34" charset="0"/>
+                <a:cs typeface="News Gothic Com Thin" panose="020B0204030503020204" pitchFamily="34" charset="0"/>
+              </a:rPr>
+              <a:t>entity's </a:t>
+            </a:r>
+            <a:r>
+              <a:rPr lang="en-US" sz="1800" dirty="0" smtClean="0">
+                <a:latin typeface="News Gothic Com Thin" panose="020B0204030503020204" pitchFamily="34" charset="0"/>
+                <a:cs typeface="News Gothic Com Thin" panose="020B0204030503020204" pitchFamily="34" charset="0"/>
+              </a:rPr>
+              <a:t>behavior</a:t>
             </a:r>
           </a:p>
           <a:p>
             <a:pPr eaLnBrk="1" hangingPunct="1"/>
-            <a:endParaRPr lang="en-US" sz="1800" smtClean="0">
+            <a:endParaRPr lang="en-US" sz="1800" dirty="0" smtClean="0">
               <a:latin typeface="News Gothic Com Thin" panose="020B0204030503020204" pitchFamily="34" charset="0"/>
               <a:cs typeface="News Gothic Com Thin" panose="020B0204030503020204" pitchFamily="34" charset="0"/>
             </a:endParaRPr>
@@ -9311,16 +9325,30 @@
           <a:p>
             <a:pPr eaLnBrk="1" hangingPunct="1"/>
             <a:r>
-              <a:rPr lang="en-US" sz="1800" smtClean="0">
+              <a:rPr lang="en-US" sz="1800" dirty="0" smtClean="0">
                 <a:latin typeface="News Gothic Com Thin" panose="020B0204030503020204" pitchFamily="34" charset="0"/>
                 <a:cs typeface="News Gothic Com Thin" panose="020B0204030503020204" pitchFamily="34" charset="0"/>
               </a:rPr>
-              <a:t>Doing so should not require altering the entity’s source code</a:t>
+              <a:t>Doing so should not require altering the </a:t>
+            </a:r>
+            <a:r>
+              <a:rPr lang="en-US" sz="1800" dirty="0" smtClean="0">
+                <a:latin typeface="News Gothic Com Thin" panose="020B0204030503020204" pitchFamily="34" charset="0"/>
+                <a:cs typeface="News Gothic Com Thin" panose="020B0204030503020204" pitchFamily="34" charset="0"/>
+              </a:rPr>
+              <a:t>entity's </a:t>
+            </a:r>
+            <a:r>
+              <a:rPr lang="en-US" sz="1800" dirty="0" smtClean="0">
+                <a:latin typeface="News Gothic Com Thin" panose="020B0204030503020204" pitchFamily="34" charset="0"/>
+                <a:cs typeface="News Gothic Com Thin" panose="020B0204030503020204" pitchFamily="34" charset="0"/>
+              </a:rPr>
+              <a:t>source code</a:t>
             </a:r>
           </a:p>
           <a:p>
             <a:pPr eaLnBrk="1" hangingPunct="1"/>
-            <a:endParaRPr lang="en-US" sz="1800" smtClean="0">
+            <a:endParaRPr lang="en-US" sz="1800" dirty="0" smtClean="0">
               <a:latin typeface="News Gothic Com Thin" panose="020B0204030503020204" pitchFamily="34" charset="0"/>
               <a:cs typeface="News Gothic Com Thin" panose="020B0204030503020204" pitchFamily="34" charset="0"/>
             </a:endParaRPr>
@@ -9328,7 +9356,7 @@
           <a:p>
             <a:pPr eaLnBrk="1" hangingPunct="1"/>
             <a:r>
-              <a:rPr lang="en-US" sz="1800" smtClean="0">
+              <a:rPr lang="en-US" sz="1800" dirty="0" smtClean="0">
                 <a:latin typeface="News Gothic Com Thin" panose="020B0204030503020204" pitchFamily="34" charset="0"/>
                 <a:cs typeface="News Gothic Com Thin" panose="020B0204030503020204" pitchFamily="34" charset="0"/>
               </a:rPr>
@@ -9341,7 +9369,7 @@
         <p:nvPicPr>
           <p:cNvPr id="27652" name="Picture 2" descr="Open/Closed Principle"/>
           <p:cNvPicPr>
-            <a:picLocks noChangeAspect="1" noChangeArrowheads="1"/>
+            <a:picLocks noChangeArrowheads="1"/>
           </p:cNvPicPr>
           <p:nvPr/>
         </p:nvPicPr>
@@ -9360,8 +9388,8 @@
         </p:blipFill>
         <p:spPr bwMode="auto">
           <a:xfrm>
-            <a:off x="5353050" y="1434703"/>
-            <a:ext cx="3333750" cy="2500313"/>
+            <a:off x="5138928" y="1138428"/>
+            <a:ext cx="4005072" cy="4005072"/>
           </a:xfrm>
           <a:prstGeom prst="rect">
             <a:avLst/>
@@ -9741,7 +9769,7 @@
           <a:p>
             <a:pPr eaLnBrk="1" hangingPunct="1"/>
             <a:r>
-              <a:rPr lang="en-US" sz="1800" smtClean="0">
+              <a:rPr lang="en-US" sz="1800" dirty="0" smtClean="0">
                 <a:latin typeface="News Gothic Com Thin" panose="020B0204030503020204" pitchFamily="34" charset="0"/>
                 <a:cs typeface="News Gothic Com Thin" panose="020B0204030503020204" pitchFamily="34" charset="0"/>
               </a:rPr>
@@ -9750,7 +9778,7 @@
           </a:p>
           <a:p>
             <a:pPr eaLnBrk="1" hangingPunct="1"/>
-            <a:endParaRPr lang="en-US" sz="1800" smtClean="0">
+            <a:endParaRPr lang="en-US" sz="1800" dirty="0" smtClean="0">
               <a:latin typeface="News Gothic Com Thin" panose="020B0204030503020204" pitchFamily="34" charset="0"/>
               <a:cs typeface="News Gothic Com Thin" panose="020B0204030503020204" pitchFamily="34" charset="0"/>
             </a:endParaRPr>
@@ -9758,16 +9786,71 @@
           <a:p>
             <a:pPr eaLnBrk="1" hangingPunct="1"/>
             <a:r>
-              <a:rPr lang="en-US" sz="1800" smtClean="0">
+              <a:rPr lang="en-US" sz="1800" dirty="0" smtClean="0">
                 <a:latin typeface="News Gothic Com Thin" panose="020B0204030503020204" pitchFamily="34" charset="0"/>
                 <a:cs typeface="News Gothic Com Thin" panose="020B0204030503020204" pitchFamily="34" charset="0"/>
               </a:rPr>
-              <a:t>“Is-A” is not sufficient; “Is-Substitutable-For” is required</a:t>
+              <a:t>"</a:t>
+            </a:r>
+            <a:r>
+              <a:rPr lang="en-US" sz="1800" dirty="0" smtClean="0">
+                <a:latin typeface="News Gothic Com Thin" panose="020B0204030503020204" pitchFamily="34" charset="0"/>
+                <a:cs typeface="News Gothic Com Thin" panose="020B0204030503020204" pitchFamily="34" charset="0"/>
+              </a:rPr>
+              <a:t>Is-A</a:t>
+            </a:r>
+            <a:r>
+              <a:rPr lang="en-US" sz="1800" dirty="0" smtClean="0">
+                <a:latin typeface="News Gothic Com Thin" panose="020B0204030503020204" pitchFamily="34" charset="0"/>
+                <a:cs typeface="News Gothic Com Thin" panose="020B0204030503020204" pitchFamily="34" charset="0"/>
+              </a:rPr>
+              <a:t>"</a:t>
+            </a:r>
+            <a:r>
+              <a:rPr lang="en-US" sz="1800" dirty="0" smtClean="0">
+                <a:latin typeface="News Gothic Com Thin" panose="020B0204030503020204" pitchFamily="34" charset="0"/>
+                <a:cs typeface="News Gothic Com Thin" panose="020B0204030503020204" pitchFamily="34" charset="0"/>
+              </a:rPr>
+              <a:t> </a:t>
+            </a:r>
+            <a:r>
+              <a:rPr lang="en-US" sz="1800" dirty="0" smtClean="0">
+                <a:latin typeface="News Gothic Com Thin" panose="020B0204030503020204" pitchFamily="34" charset="0"/>
+                <a:cs typeface="News Gothic Com Thin" panose="020B0204030503020204" pitchFamily="34" charset="0"/>
+              </a:rPr>
+              <a:t>is not sufficient</a:t>
+            </a:r>
+            <a:r>
+              <a:rPr lang="en-US" sz="1800" dirty="0" smtClean="0">
+                <a:latin typeface="News Gothic Com Thin" panose="020B0204030503020204" pitchFamily="34" charset="0"/>
+                <a:cs typeface="News Gothic Com Thin" panose="020B0204030503020204" pitchFamily="34" charset="0"/>
+              </a:rPr>
+              <a:t>;</a:t>
+            </a:r>
+            <a:br>
+              <a:rPr lang="en-US" sz="1800" dirty="0" smtClean="0">
+                <a:latin typeface="News Gothic Com Thin" panose="020B0204030503020204" pitchFamily="34" charset="0"/>
+                <a:cs typeface="News Gothic Com Thin" panose="020B0204030503020204" pitchFamily="34" charset="0"/>
+              </a:rPr>
+            </a:br>
+            <a:r>
+              <a:rPr lang="en-US" sz="1800" dirty="0" smtClean="0">
+                <a:latin typeface="News Gothic Com Thin" panose="020B0204030503020204" pitchFamily="34" charset="0"/>
+                <a:cs typeface="News Gothic Com Thin" panose="020B0204030503020204" pitchFamily="34" charset="0"/>
+              </a:rPr>
+              <a:t>"Is-Substitutable-For" is </a:t>
+            </a:r>
+            <a:r>
+              <a:rPr lang="en-US" sz="1800" dirty="0" smtClean="0">
+                <a:latin typeface="News Gothic Com Thin" panose="020B0204030503020204" pitchFamily="34" charset="0"/>
+                <a:cs typeface="News Gothic Com Thin" panose="020B0204030503020204" pitchFamily="34" charset="0"/>
+              </a:rPr>
+              <a:t>required</a:t>
             </a:r>
           </a:p>
           <a:p>
             <a:pPr eaLnBrk="1" hangingPunct="1"/>
-            <a:endParaRPr lang="en-US" sz="1800" smtClean="0">
+            <a:endParaRPr lang="en-US" sz="1800" dirty="0" smtClean="0">
               <a:latin typeface="News Gothic Com Thin" panose="020B0204030503020204" pitchFamily="34" charset="0"/>
               <a:cs typeface="News Gothic Com Thin" panose="020B0204030503020204" pitchFamily="34" charset="0"/>
             </a:endParaRPr>
@@ -9775,31 +9858,26 @@
           <a:p>
             <a:pPr eaLnBrk="1" hangingPunct="1"/>
             <a:r>
-              <a:rPr lang="en-US" sz="1800" smtClean="0">
+              <a:rPr lang="en-US" sz="1800" dirty="0" smtClean="0">
                 <a:latin typeface="News Gothic Com Thin" panose="020B0204030503020204" pitchFamily="34" charset="0"/>
                 <a:cs typeface="News Gothic Com Thin" panose="020B0204030503020204" pitchFamily="34" charset="0"/>
               </a:rPr>
-              <a:t>Look for type checking in polymorphic code as a “code smell” indicating this principle is being violated</a:t>
-            </a:r>
-          </a:p>
-        </p:txBody>
-      </p:sp>
-      <p:sp>
-        <p:nvSpPr>
-          <p:cNvPr id="2" name="Content Placeholder 1"/>
-          <p:cNvSpPr>
-            <a:spLocks noGrp="1"/>
-          </p:cNvSpPr>
-          <p:nvPr>
-            <p:ph sz="half" idx="2"/>
-          </p:nvPr>
-        </p:nvSpPr>
-        <p:spPr/>
-        <p:txBody>
-          <a:bodyPr/>
-          <a:lstStyle/>
-          <a:p>
-            <a:endParaRPr lang="en-US"/>
+              <a:t>Look for type checking in polymorphic code as a </a:t>
+            </a:r>
+            <a:r>
+              <a:rPr lang="en-US" sz="1800" dirty="0" smtClean="0">
+                <a:latin typeface="News Gothic Com Thin" panose="020B0204030503020204" pitchFamily="34" charset="0"/>
+                <a:cs typeface="News Gothic Com Thin" panose="020B0204030503020204" pitchFamily="34" charset="0"/>
+              </a:rPr>
+              <a:t>"code smell" </a:t>
+            </a:r>
+            <a:r>
+              <a:rPr lang="en-US" sz="1800" dirty="0" smtClean="0">
+                <a:latin typeface="News Gothic Com Thin" panose="020B0204030503020204" pitchFamily="34" charset="0"/>
+                <a:cs typeface="News Gothic Com Thin" panose="020B0204030503020204" pitchFamily="34" charset="0"/>
+              </a:rPr>
+              <a:t>indicating this principle is being violated</a:t>
+            </a:r>
           </a:p>
         </p:txBody>
       </p:sp>
@@ -9807,7 +9885,7 @@
         <p:nvPicPr>
           <p:cNvPr id="29700" name="Picture 2" descr="Liskov Substitution Principle"/>
           <p:cNvPicPr>
-            <a:picLocks noChangeAspect="1" noChangeArrowheads="1"/>
+            <a:picLocks noChangeArrowheads="1"/>
           </p:cNvPicPr>
           <p:nvPr/>
         </p:nvPicPr>
@@ -9826,8 +9904,8 @@
         </p:blipFill>
         <p:spPr bwMode="auto">
           <a:xfrm>
-            <a:off x="5353050" y="1434703"/>
-            <a:ext cx="3333750" cy="2500313"/>
+            <a:off x="5138928" y="1138428"/>
+            <a:ext cx="4005072" cy="4005072"/>
           </a:xfrm>
           <a:prstGeom prst="rect">
             <a:avLst/>
@@ -10144,16 +10222,23 @@
           <a:p>
             <a:pPr eaLnBrk="1" hangingPunct="1"/>
             <a:r>
-              <a:rPr lang="en-US" sz="1800" smtClean="0">
+              <a:rPr lang="en-US" sz="1800" dirty="0" smtClean="0">
                 <a:latin typeface="News Gothic Com Thin" panose="020B0204030503020204" pitchFamily="34" charset="0"/>
                 <a:cs typeface="News Gothic Com Thin" panose="020B0204030503020204" pitchFamily="34" charset="0"/>
               </a:rPr>
-              <a:t>Don’t force clients to depend on methods they do not need</a:t>
+              <a:t>Don't </a:t>
+            </a:r>
+            <a:r>
+              <a:rPr lang="en-US" sz="1800" dirty="0" smtClean="0">
+                <a:latin typeface="News Gothic Com Thin" panose="020B0204030503020204" pitchFamily="34" charset="0"/>
+                <a:cs typeface="News Gothic Com Thin" panose="020B0204030503020204" pitchFamily="34" charset="0"/>
+              </a:rPr>
+              <a:t>force clients to depend on methods they do not need</a:t>
             </a:r>
           </a:p>
           <a:p>
             <a:pPr eaLnBrk="1" hangingPunct="1"/>
-            <a:endParaRPr lang="en-US" sz="1800" smtClean="0">
+            <a:endParaRPr lang="en-US" sz="1800" dirty="0" smtClean="0">
               <a:latin typeface="News Gothic Com Thin" panose="020B0204030503020204" pitchFamily="34" charset="0"/>
               <a:cs typeface="News Gothic Com Thin" panose="020B0204030503020204" pitchFamily="34" charset="0"/>
             </a:endParaRPr>
@@ -10161,7 +10246,7 @@
           <a:p>
             <a:pPr eaLnBrk="1" hangingPunct="1"/>
             <a:r>
-              <a:rPr lang="en-US" sz="1800" smtClean="0">
+              <a:rPr lang="en-US" sz="1800" dirty="0" smtClean="0">
                 <a:latin typeface="News Gothic Com Thin" panose="020B0204030503020204" pitchFamily="34" charset="0"/>
                 <a:cs typeface="News Gothic Com Thin" panose="020B0204030503020204" pitchFamily="34" charset="0"/>
               </a:rPr>
@@ -10170,7 +10255,7 @@
           </a:p>
           <a:p>
             <a:pPr eaLnBrk="1" hangingPunct="1"/>
-            <a:endParaRPr lang="en-US" sz="1800" smtClean="0">
+            <a:endParaRPr lang="en-US" sz="1800" dirty="0" smtClean="0">
               <a:latin typeface="News Gothic Com Thin" panose="020B0204030503020204" pitchFamily="34" charset="0"/>
               <a:cs typeface="News Gothic Com Thin" panose="020B0204030503020204" pitchFamily="34" charset="0"/>
             </a:endParaRPr>
@@ -10178,31 +10263,12 @@
           <a:p>
             <a:pPr eaLnBrk="1" hangingPunct="1"/>
             <a:r>
-              <a:rPr lang="en-US" sz="1800" smtClean="0">
+              <a:rPr lang="en-US" sz="1800" dirty="0" smtClean="0">
                 <a:latin typeface="News Gothic Com Thin" panose="020B0204030503020204" pitchFamily="34" charset="0"/>
                 <a:cs typeface="News Gothic Com Thin" panose="020B0204030503020204" pitchFamily="34" charset="0"/>
               </a:rPr>
               <a:t>Break large interfaces up into smaller ones</a:t>
             </a:r>
-          </a:p>
-        </p:txBody>
-      </p:sp>
-      <p:sp>
-        <p:nvSpPr>
-          <p:cNvPr id="2" name="Content Placeholder 1"/>
-          <p:cNvSpPr>
-            <a:spLocks noGrp="1"/>
-          </p:cNvSpPr>
-          <p:nvPr>
-            <p:ph sz="half" idx="2"/>
-          </p:nvPr>
-        </p:nvSpPr>
-        <p:spPr/>
-        <p:txBody>
-          <a:bodyPr/>
-          <a:lstStyle/>
-          <a:p>
-            <a:endParaRPr lang="en-US"/>
           </a:p>
         </p:txBody>
       </p:sp>
@@ -10210,7 +10276,7 @@
         <p:nvPicPr>
           <p:cNvPr id="31748" name="Picture 2" descr="Interface Segregation Principle"/>
           <p:cNvPicPr>
-            <a:picLocks noChangeAspect="1" noChangeArrowheads="1"/>
+            <a:picLocks noChangeArrowheads="1"/>
           </p:cNvPicPr>
           <p:nvPr/>
         </p:nvPicPr>
@@ -10229,8 +10295,8 @@
         </p:blipFill>
         <p:spPr bwMode="auto">
           <a:xfrm>
-            <a:off x="5353050" y="1434703"/>
-            <a:ext cx="3333750" cy="2500313"/>
+            <a:off x="5138928" y="1138428"/>
+            <a:ext cx="4005072" cy="4005072"/>
           </a:xfrm>
           <a:prstGeom prst="rect">
             <a:avLst/>
@@ -10613,7 +10679,7 @@
         <p:nvPicPr>
           <p:cNvPr id="33796" name="Picture 2" descr="Dependency Inversion Principle"/>
           <p:cNvPicPr>
-            <a:picLocks noChangeAspect="1" noChangeArrowheads="1"/>
+            <a:picLocks noChangeArrowheads="1"/>
           </p:cNvPicPr>
           <p:nvPr/>
         </p:nvPicPr>
@@ -10632,8 +10698,8 @@
         </p:blipFill>
         <p:spPr bwMode="auto">
           <a:xfrm>
-            <a:off x="5353050" y="1489472"/>
-            <a:ext cx="3333750" cy="2500313"/>
+            <a:off x="5138928" y="1138428"/>
+            <a:ext cx="4005072" cy="4005072"/>
           </a:xfrm>
           <a:prstGeom prst="rect">
             <a:avLst/>
@@ -10924,11 +10990,18 @@
           <a:p>
             <a:pPr eaLnBrk="1" hangingPunct="1"/>
             <a:r>
-              <a:rPr lang="en-US" smtClean="0">
+              <a:rPr lang="en-US" dirty="0" smtClean="0">
                 <a:latin typeface="News Gothic Com Thin" panose="020B0204030503020204" pitchFamily="34" charset="0"/>
                 <a:cs typeface="News Gothic Com Thin" panose="020B0204030503020204" pitchFamily="34" charset="0"/>
               </a:rPr>
-              <a:t>Don’t Repeat Yourself</a:t>
+              <a:t>Don't </a:t>
+            </a:r>
+            <a:r>
+              <a:rPr lang="en-US" dirty="0" smtClean="0">
+                <a:latin typeface="News Gothic Com Thin" panose="020B0204030503020204" pitchFamily="34" charset="0"/>
+                <a:cs typeface="News Gothic Com Thin" panose="020B0204030503020204" pitchFamily="34" charset="0"/>
+              </a:rPr>
+              <a:t>Repeat Yourself</a:t>
             </a:r>
           </a:p>
         </p:txBody>
@@ -10990,25 +11063,6 @@
               </a:rPr>
               <a:t>Clean up duplication whenever you can in your code</a:t>
             </a:r>
-          </a:p>
-        </p:txBody>
-      </p:sp>
-      <p:sp>
-        <p:nvSpPr>
-          <p:cNvPr id="2" name="Content Placeholder 1"/>
-          <p:cNvSpPr>
-            <a:spLocks noGrp="1"/>
-          </p:cNvSpPr>
-          <p:nvPr>
-            <p:ph sz="half" idx="2"/>
-          </p:nvPr>
-        </p:nvSpPr>
-        <p:spPr/>
-        <p:txBody>
-          <a:bodyPr/>
-          <a:lstStyle/>
-          <a:p>
-            <a:endParaRPr lang="en-US"/>
           </a:p>
         </p:txBody>
       </p:sp>
@@ -11035,8 +11089,8 @@
         </p:blipFill>
         <p:spPr bwMode="auto">
           <a:xfrm>
-            <a:off x="5645150" y="1641873"/>
-            <a:ext cx="3041650" cy="2293144"/>
+            <a:off x="5138928" y="1138428"/>
+            <a:ext cx="4005072" cy="4005072"/>
           </a:xfrm>
           <a:prstGeom prst="rect">
             <a:avLst/>
@@ -11359,7 +11413,14 @@
                 <a:latin typeface="News Gothic Com Thin" panose="020B0204030503020204" pitchFamily="34" charset="0"/>
                 <a:cs typeface="News Gothic Com Thin" panose="020B0204030503020204" pitchFamily="34" charset="0"/>
               </a:rPr>
-              <a:t>Don’t try to apply every principle, all the time</a:t>
+              <a:t>Don't </a:t>
+            </a:r>
+            <a:r>
+              <a:rPr lang="en-US" sz="2400" dirty="0" smtClean="0">
+                <a:latin typeface="News Gothic Com Thin" panose="020B0204030503020204" pitchFamily="34" charset="0"/>
+                <a:cs typeface="News Gothic Com Thin" panose="020B0204030503020204" pitchFamily="34" charset="0"/>
+              </a:rPr>
+              <a:t>try to apply every principle, all the time</a:t>
             </a:r>
           </a:p>
           <a:p>
@@ -11410,8 +11471,26 @@
                 <a:latin typeface="News Gothic Com Thin" panose="020B0204030503020204" pitchFamily="34" charset="0"/>
                 <a:cs typeface="News Gothic Com Thin" panose="020B0204030503020204" pitchFamily="34" charset="0"/>
               </a:rPr>
-              <a:t>Follow principles when their violation is causing you pain.</a:t>
-            </a:r>
+              <a:t>Follow principles when their violation is causing </a:t>
+            </a:r>
+            <a:r>
+              <a:rPr lang="en-US" sz="2400" smtClean="0">
+                <a:latin typeface="News Gothic Com Thin" panose="020B0204030503020204" pitchFamily="34" charset="0"/>
+                <a:cs typeface="News Gothic Com Thin" panose="020B0204030503020204" pitchFamily="34" charset="0"/>
+              </a:rPr>
+              <a:t>you </a:t>
+            </a:r>
+            <a:r>
+              <a:rPr lang="en-US" sz="2400" smtClean="0">
+                <a:latin typeface="News Gothic Com Thin" panose="020B0204030503020204" pitchFamily="34" charset="0"/>
+                <a:cs typeface="News Gothic Com Thin" panose="020B0204030503020204" pitchFamily="34" charset="0"/>
+              </a:rPr>
+              <a:t>pain</a:t>
+            </a:r>
+            <a:endParaRPr lang="en-US" sz="2400" dirty="0" smtClean="0">
+              <a:latin typeface="News Gothic Com Thin" panose="020B0204030503020204" pitchFamily="34" charset="0"/>
+              <a:cs typeface="News Gothic Com Thin" panose="020B0204030503020204" pitchFamily="34" charset="0"/>
+            </a:endParaRPr>
           </a:p>
         </p:txBody>
       </p:sp>
@@ -11882,10 +11961,6 @@
               </a:rPr>
               <a:t>YAGNI</a:t>
             </a:r>
-            <a:endParaRPr lang="en-US" sz="2400" dirty="0" smtClean="0">
-              <a:latin typeface="News Gothic Com Thin" panose="020B0204030503020204" pitchFamily="34" charset="0"/>
-              <a:cs typeface="News Gothic Com Thin" panose="020B0204030503020204" pitchFamily="34" charset="0"/>
-            </a:endParaRPr>
           </a:p>
           <a:p>
             <a:pPr eaLnBrk="1" hangingPunct="1"/>
@@ -11894,7 +11969,14 @@
                 <a:latin typeface="News Gothic Com Thin" panose="020B0204030503020204" pitchFamily="34" charset="0"/>
                 <a:cs typeface="News Gothic Com Thin" panose="020B0204030503020204" pitchFamily="34" charset="0"/>
               </a:rPr>
-              <a:t>Don’t Repeat Yourself</a:t>
+              <a:t>Don't </a:t>
+            </a:r>
+            <a:r>
+              <a:rPr lang="en-US" sz="2400" dirty="0" smtClean="0">
+                <a:latin typeface="News Gothic Com Thin" panose="020B0204030503020204" pitchFamily="34" charset="0"/>
+                <a:cs typeface="News Gothic Com Thin" panose="020B0204030503020204" pitchFamily="34" charset="0"/>
+              </a:rPr>
+              <a:t>Repeat Yourself</a:t>
             </a:r>
           </a:p>
           <a:p>
@@ -11964,11 +12046,11 @@
               <a:t>Single </a:t>
             </a:r>
             <a:r>
-              <a:rPr lang="en-US" sz="2400" dirty="0" err="1" smtClean="0">
+              <a:rPr lang="en-US" sz="2400" dirty="0" smtClean="0">
                 <a:latin typeface="News Gothic Com Thin" panose="020B0204030503020204" pitchFamily="34" charset="0"/>
                 <a:cs typeface="News Gothic Com Thin" panose="020B0204030503020204" pitchFamily="34" charset="0"/>
               </a:rPr>
-              <a:t>Reponsibility</a:t>
+              <a:t>Responsibility</a:t>
             </a:r>
             <a:endParaRPr lang="en-US" sz="2400" dirty="0" smtClean="0">
               <a:latin typeface="News Gothic Com Thin" panose="020B0204030503020204" pitchFamily="34" charset="0"/>
@@ -12029,7 +12111,7 @@
                 <a:latin typeface="News Gothic Com Thin" panose="020B0204030503020204" pitchFamily="34" charset="0"/>
                 <a:cs typeface="News Gothic Com Thin" panose="020B0204030503020204" pitchFamily="34" charset="0"/>
               </a:rPr>
-              <a:t>Don’t </a:t>
+              <a:t>Don't </a:t>
             </a:r>
             <a:r>
               <a:rPr lang="en-US" sz="2400" dirty="0" smtClean="0">
@@ -12904,7 +12986,7 @@
           <a:p>
             <a:pPr eaLnBrk="1" hangingPunct="1"/>
             <a:r>
-              <a:rPr lang="en-US" smtClean="0">
+              <a:rPr lang="en-US" dirty="0" smtClean="0">
                 <a:latin typeface="News Gothic Com Thin" panose="020B0204030503020204" pitchFamily="34" charset="0"/>
                 <a:cs typeface="News Gothic Com Thin" panose="020B0204030503020204" pitchFamily="34" charset="0"/>
               </a:rPr>
@@ -12930,7 +13012,7 @@
           <a:p>
             <a:pPr eaLnBrk="1" hangingPunct="1"/>
             <a:r>
-              <a:rPr lang="en-US" sz="1800" smtClean="0">
+              <a:rPr lang="en-US" sz="1800" dirty="0" smtClean="0">
                 <a:latin typeface="News Gothic Com Thin" panose="020B0204030503020204" pitchFamily="34" charset="0"/>
                 <a:cs typeface="News Gothic Com Thin" panose="020B0204030503020204" pitchFamily="34" charset="0"/>
               </a:rPr>
@@ -12939,7 +13021,7 @@
           </a:p>
           <a:p>
             <a:pPr eaLnBrk="1" hangingPunct="1"/>
-            <a:endParaRPr lang="en-US" sz="1800" smtClean="0">
+            <a:endParaRPr lang="en-US" sz="1800" dirty="0" smtClean="0">
               <a:latin typeface="News Gothic Com Thin" panose="020B0204030503020204" pitchFamily="34" charset="0"/>
               <a:cs typeface="News Gothic Com Thin" panose="020B0204030503020204" pitchFamily="34" charset="0"/>
             </a:endParaRPr>
@@ -12947,7 +13029,7 @@
           <a:p>
             <a:pPr eaLnBrk="1" hangingPunct="1"/>
             <a:r>
-              <a:rPr lang="en-US" sz="1800" smtClean="0">
+              <a:rPr lang="en-US" sz="1800" dirty="0" smtClean="0">
                 <a:latin typeface="News Gothic Com Thin" panose="020B0204030503020204" pitchFamily="34" charset="0"/>
                 <a:cs typeface="News Gothic Com Thin" panose="020B0204030503020204" pitchFamily="34" charset="0"/>
               </a:rPr>
@@ -12956,7 +13038,7 @@
           </a:p>
           <a:p>
             <a:pPr eaLnBrk="1" hangingPunct="1"/>
-            <a:endParaRPr lang="en-US" sz="1800" smtClean="0">
+            <a:endParaRPr lang="en-US" sz="1800" dirty="0" smtClean="0">
               <a:latin typeface="News Gothic Com Thin" panose="020B0204030503020204" pitchFamily="34" charset="0"/>
               <a:cs typeface="News Gothic Com Thin" panose="020B0204030503020204" pitchFamily="34" charset="0"/>
             </a:endParaRPr>
@@ -12964,11 +13046,66 @@
           <a:p>
             <a:pPr eaLnBrk="1" hangingPunct="1"/>
             <a:r>
-              <a:rPr lang="en-US" sz="1800" smtClean="0">
+              <a:rPr lang="en-US" sz="1800" dirty="0" smtClean="0">
                 <a:latin typeface="News Gothic Com Thin" panose="020B0204030503020204" pitchFamily="34" charset="0"/>
                 <a:cs typeface="News Gothic Com Thin" panose="020B0204030503020204" pitchFamily="34" charset="0"/>
               </a:rPr>
-              <a:t>“Everything should be as simple as possible, but no simpler.” – Albert Einstein</a:t>
+              <a:t>"</a:t>
+            </a:r>
+            <a:r>
+              <a:rPr lang="en-US" sz="1800" dirty="0" smtClean="0">
+                <a:latin typeface="News Gothic Com Thin" panose="020B0204030503020204" pitchFamily="34" charset="0"/>
+                <a:cs typeface="News Gothic Com Thin" panose="020B0204030503020204" pitchFamily="34" charset="0"/>
+              </a:rPr>
+              <a:t>Everything </a:t>
+            </a:r>
+            <a:r>
+              <a:rPr lang="en-US" sz="1800" dirty="0" smtClean="0">
+                <a:latin typeface="News Gothic Com Thin" panose="020B0204030503020204" pitchFamily="34" charset="0"/>
+                <a:cs typeface="News Gothic Com Thin" panose="020B0204030503020204" pitchFamily="34" charset="0"/>
+              </a:rPr>
+              <a:t>should be as </a:t>
+            </a:r>
+            <a:r>
+              <a:rPr lang="en-US" sz="1800" dirty="0" smtClean="0">
+                <a:latin typeface="News Gothic Com Thin" panose="020B0204030503020204" pitchFamily="34" charset="0"/>
+                <a:cs typeface="News Gothic Com Thin" panose="020B0204030503020204" pitchFamily="34" charset="0"/>
+              </a:rPr>
+              <a:t>simple </a:t>
+            </a:r>
+            <a:r>
+              <a:rPr lang="en-US" sz="1800" dirty="0" smtClean="0">
+                <a:latin typeface="News Gothic Com Thin" panose="020B0204030503020204" pitchFamily="34" charset="0"/>
+                <a:cs typeface="News Gothic Com Thin" panose="020B0204030503020204" pitchFamily="34" charset="0"/>
+              </a:rPr>
+              <a:t>as possible, but no simpler</a:t>
+            </a:r>
+            <a:r>
+              <a:rPr lang="en-US" sz="1800" dirty="0" smtClean="0">
+                <a:latin typeface="News Gothic Com Thin" panose="020B0204030503020204" pitchFamily="34" charset="0"/>
+                <a:cs typeface="News Gothic Com Thin" panose="020B0204030503020204" pitchFamily="34" charset="0"/>
+              </a:rPr>
+              <a:t>."</a:t>
+            </a:r>
+            <a:br>
+              <a:rPr lang="en-US" sz="1800" dirty="0" smtClean="0">
+                <a:latin typeface="News Gothic Com Thin" panose="020B0204030503020204" pitchFamily="34" charset="0"/>
+                <a:cs typeface="News Gothic Com Thin" panose="020B0204030503020204" pitchFamily="34" charset="0"/>
+              </a:rPr>
+            </a:br>
+            <a:r>
+              <a:rPr lang="en-US" sz="1800" dirty="0" smtClean="0">
+                <a:latin typeface="News Gothic Com Thin" panose="020B0204030503020204" pitchFamily="34" charset="0"/>
+                <a:cs typeface="News Gothic Com Thin" panose="020B0204030503020204" pitchFamily="34" charset="0"/>
+              </a:rPr>
+              <a:t>– </a:t>
+            </a:r>
+            <a:r>
+              <a:rPr lang="en-US" sz="1800" dirty="0" smtClean="0">
+                <a:latin typeface="News Gothic Com Thin" panose="020B0204030503020204" pitchFamily="34" charset="0"/>
+                <a:cs typeface="News Gothic Com Thin" panose="020B0204030503020204" pitchFamily="34" charset="0"/>
+              </a:rPr>
+              <a:t>Albert Einstein</a:t>
             </a:r>
           </a:p>
         </p:txBody>
@@ -12996,8 +13133,8 @@
         </p:blipFill>
         <p:spPr bwMode="auto">
           <a:xfrm>
-            <a:off x="5036802" y="1197517"/>
-            <a:ext cx="3649999" cy="2737499"/>
+            <a:off x="5143500" y="1143000"/>
+            <a:ext cx="4000500" cy="4000500"/>
           </a:xfrm>
           <a:prstGeom prst="rect">
             <a:avLst/>
@@ -13279,8 +13416,8 @@
         </p:nvSpPr>
         <p:spPr>
           <a:xfrm>
-            <a:off x="457201" y="1171561"/>
-            <a:ext cx="7124514" cy="3869718"/>
+            <a:off x="1082839" y="1179823"/>
+            <a:ext cx="6713620" cy="3583319"/>
           </a:xfrm>
           <a:prstGeom prst="roundRect">
             <a:avLst/>
@@ -13478,16 +13615,37 @@
           <a:p>
             <a:pPr eaLnBrk="1" hangingPunct="1"/>
             <a:r>
-              <a:rPr lang="en-US" sz="1800" smtClean="0">
+              <a:rPr lang="en-US" sz="1800" dirty="0" smtClean="0">
                 <a:latin typeface="News Gothic Com Thin" panose="020B0204030503020204" pitchFamily="34" charset="0"/>
                 <a:cs typeface="News Gothic Com Thin" panose="020B0204030503020204" pitchFamily="34" charset="0"/>
               </a:rPr>
-              <a:t>You Aren’t Gonna Need It</a:t>
+              <a:t>You </a:t>
+            </a:r>
+            <a:r>
+              <a:rPr lang="en-US" sz="1800" dirty="0" smtClean="0">
+                <a:latin typeface="News Gothic Com Thin" panose="020B0204030503020204" pitchFamily="34" charset="0"/>
+                <a:cs typeface="News Gothic Com Thin" panose="020B0204030503020204" pitchFamily="34" charset="0"/>
+              </a:rPr>
+              <a:t>Aren't </a:t>
+            </a:r>
+            <a:r>
+              <a:rPr lang="en-US" sz="1800" dirty="0" err="1" smtClean="0">
+                <a:latin typeface="News Gothic Com Thin" panose="020B0204030503020204" pitchFamily="34" charset="0"/>
+                <a:cs typeface="News Gothic Com Thin" panose="020B0204030503020204" pitchFamily="34" charset="0"/>
+              </a:rPr>
+              <a:t>Gonna</a:t>
+            </a:r>
+            <a:r>
+              <a:rPr lang="en-US" sz="1800" dirty="0" smtClean="0">
+                <a:latin typeface="News Gothic Com Thin" panose="020B0204030503020204" pitchFamily="34" charset="0"/>
+                <a:cs typeface="News Gothic Com Thin" panose="020B0204030503020204" pitchFamily="34" charset="0"/>
+              </a:rPr>
+              <a:t> Need It</a:t>
             </a:r>
           </a:p>
           <a:p>
             <a:pPr eaLnBrk="1" hangingPunct="1"/>
-            <a:endParaRPr lang="en-US" sz="1800" smtClean="0">
+            <a:endParaRPr lang="en-US" sz="1800" dirty="0" smtClean="0">
               <a:latin typeface="News Gothic Com Thin" panose="020B0204030503020204" pitchFamily="34" charset="0"/>
               <a:cs typeface="News Gothic Com Thin" panose="020B0204030503020204" pitchFamily="34" charset="0"/>
             </a:endParaRPr>
@@ -13495,7 +13653,7 @@
           <a:p>
             <a:pPr eaLnBrk="1" hangingPunct="1"/>
             <a:r>
-              <a:rPr lang="en-US" sz="1800" smtClean="0">
+              <a:rPr lang="en-US" sz="1800" dirty="0" smtClean="0">
                 <a:latin typeface="News Gothic Com Thin" panose="020B0204030503020204" pitchFamily="34" charset="0"/>
                 <a:cs typeface="News Gothic Com Thin" panose="020B0204030503020204" pitchFamily="34" charset="0"/>
               </a:rPr>
@@ -13504,7 +13662,7 @@
           </a:p>
           <a:p>
             <a:pPr eaLnBrk="1" hangingPunct="1"/>
-            <a:endParaRPr lang="en-US" sz="1800" smtClean="0">
+            <a:endParaRPr lang="en-US" sz="1800" dirty="0" smtClean="0">
               <a:latin typeface="News Gothic Com Thin" panose="020B0204030503020204" pitchFamily="34" charset="0"/>
               <a:cs typeface="News Gothic Com Thin" panose="020B0204030503020204" pitchFamily="34" charset="0"/>
             </a:endParaRPr>
@@ -13512,7 +13670,7 @@
           <a:p>
             <a:pPr eaLnBrk="1" hangingPunct="1"/>
             <a:r>
-              <a:rPr lang="en-US" sz="1800" smtClean="0">
+              <a:rPr lang="en-US" sz="1800" dirty="0" smtClean="0">
                 <a:latin typeface="News Gothic Com Thin" panose="020B0204030503020204" pitchFamily="34" charset="0"/>
                 <a:cs typeface="News Gothic Com Thin" panose="020B0204030503020204" pitchFamily="34" charset="0"/>
               </a:rPr>
@@ -13521,7 +13679,7 @@
           </a:p>
           <a:p>
             <a:pPr eaLnBrk="1" hangingPunct="1"/>
-            <a:endParaRPr lang="en-US" sz="1800" smtClean="0">
+            <a:endParaRPr lang="en-US" sz="1800" dirty="0" smtClean="0">
               <a:latin typeface="News Gothic Com Thin" panose="020B0204030503020204" pitchFamily="34" charset="0"/>
               <a:cs typeface="News Gothic Com Thin" panose="020B0204030503020204" pitchFamily="34" charset="0"/>
             </a:endParaRPr>
@@ -13529,21 +13687,28 @@
           <a:p>
             <a:pPr eaLnBrk="1" hangingPunct="1"/>
             <a:r>
-              <a:rPr lang="en-US" sz="1800" smtClean="0">
+              <a:rPr lang="en-US" sz="1800" dirty="0" smtClean="0">
                 <a:latin typeface="News Gothic Com Thin" panose="020B0204030503020204" pitchFamily="34" charset="0"/>
                 <a:cs typeface="News Gothic Com Thin" panose="020B0204030503020204" pitchFamily="34" charset="0"/>
               </a:rPr>
-              <a:t>Don’t waste time building things you </a:t>
-            </a:r>
-            <a:r>
-              <a:rPr lang="en-US" sz="1800" i="1" smtClean="0">
+              <a:t>Don't </a:t>
+            </a:r>
+            <a:r>
+              <a:rPr lang="en-US" sz="1800" dirty="0" smtClean="0">
+                <a:latin typeface="News Gothic Com Thin" panose="020B0204030503020204" pitchFamily="34" charset="0"/>
+                <a:cs typeface="News Gothic Com Thin" panose="020B0204030503020204" pitchFamily="34" charset="0"/>
+              </a:rPr>
+              <a:t>waste time building things you </a:t>
+            </a:r>
+            <a:r>
+              <a:rPr lang="en-US" sz="1800" i="1" dirty="0" smtClean="0">
                 <a:latin typeface="News Gothic Com Thin" panose="020B0204030503020204" pitchFamily="34" charset="0"/>
                 <a:cs typeface="News Gothic Com Thin" panose="020B0204030503020204" pitchFamily="34" charset="0"/>
               </a:rPr>
               <a:t>might</a:t>
             </a:r>
             <a:r>
-              <a:rPr lang="en-US" sz="1800" smtClean="0">
+              <a:rPr lang="en-US" sz="1800" dirty="0" smtClean="0">
                 <a:latin typeface="News Gothic Com Thin" panose="020B0204030503020204" pitchFamily="34" charset="0"/>
                 <a:cs typeface="News Gothic Com Thin" panose="020B0204030503020204" pitchFamily="34" charset="0"/>
               </a:rPr>
@@ -13575,8 +13740,8 @@
         </p:blipFill>
         <p:spPr bwMode="auto">
           <a:xfrm>
-            <a:off x="5353050" y="1440656"/>
-            <a:ext cx="3333750" cy="2500313"/>
+            <a:off x="5143500" y="1143000"/>
+            <a:ext cx="4000500" cy="4000500"/>
           </a:xfrm>
           <a:prstGeom prst="rect">
             <a:avLst/>
@@ -13928,11 +14093,18 @@
           <a:p>
             <a:pPr eaLnBrk="1" hangingPunct="1"/>
             <a:r>
-              <a:rPr lang="en-US" smtClean="0">
+              <a:rPr lang="en-US" dirty="0" smtClean="0">
                 <a:latin typeface="News Gothic Com Thin" panose="020B0204030503020204" pitchFamily="34" charset="0"/>
                 <a:cs typeface="News Gothic Com Thin" panose="020B0204030503020204" pitchFamily="34" charset="0"/>
               </a:rPr>
-              <a:t>Don’t Repeat Yourself</a:t>
+              <a:t>Don't </a:t>
+            </a:r>
+            <a:r>
+              <a:rPr lang="en-US" dirty="0" smtClean="0">
+                <a:latin typeface="News Gothic Com Thin" panose="020B0204030503020204" pitchFamily="34" charset="0"/>
+                <a:cs typeface="News Gothic Com Thin" panose="020B0204030503020204" pitchFamily="34" charset="0"/>
+              </a:rPr>
+              <a:t>Repeat Yourself</a:t>
             </a:r>
           </a:p>
         </p:txBody>
@@ -14056,8 +14228,8 @@
         </p:blipFill>
         <p:spPr bwMode="auto">
           <a:xfrm>
-            <a:off x="5353050" y="1434703"/>
-            <a:ext cx="3333750" cy="2500313"/>
+            <a:off x="5138928" y="1138428"/>
+            <a:ext cx="4005072" cy="4005072"/>
           </a:xfrm>
           <a:prstGeom prst="rect">
             <a:avLst/>
@@ -14581,8 +14753,8 @@
         </p:blipFill>
         <p:spPr bwMode="auto">
           <a:xfrm>
-            <a:off x="5353050" y="1489472"/>
-            <a:ext cx="3333750" cy="2500313"/>
+            <a:off x="5143500" y="1143000"/>
+            <a:ext cx="4000500" cy="4000500"/>
           </a:xfrm>
           <a:prstGeom prst="rect">
             <a:avLst/>
@@ -15045,8 +15217,19 @@
                 <a:latin typeface="News Gothic Com Thin" panose="020B0204030503020204" pitchFamily="34" charset="0"/>
                 <a:cs typeface="News Gothic Com Thin" panose="020B0204030503020204" pitchFamily="34" charset="0"/>
               </a:rPr>
+              <a:t> </a:t>
+            </a:r>
+            <a:r>
+              <a:rPr lang="en-US" sz="1800" dirty="0" smtClean="0">
+                <a:latin typeface="News Gothic Com Thin" panose="020B0204030503020204" pitchFamily="34" charset="0"/>
+                <a:cs typeface="News Gothic Com Thin" panose="020B0204030503020204" pitchFamily="34" charset="0"/>
+              </a:rPr>
               <a:t> keyword</a:t>
             </a:r>
+            <a:endParaRPr lang="en-US" sz="1800" dirty="0" smtClean="0">
+              <a:latin typeface="News Gothic Com Thin" panose="020B0204030503020204" pitchFamily="34" charset="0"/>
+              <a:cs typeface="News Gothic Com Thin" panose="020B0204030503020204" pitchFamily="34" charset="0"/>
+            </a:endParaRPr>
           </a:p>
           <a:p>
             <a:pPr lvl="1" eaLnBrk="1" hangingPunct="1"/>
@@ -15055,8 +15238,26 @@
                 <a:latin typeface="News Gothic Com Thin" panose="020B0204030503020204" pitchFamily="34" charset="0"/>
                 <a:cs typeface="News Gothic Com Thin" panose="020B0204030503020204" pitchFamily="34" charset="0"/>
               </a:rPr>
-              <a:t>Remember, “new is glue”</a:t>
-            </a:r>
+              <a:t>Remember, "new </a:t>
+            </a:r>
+            <a:r>
+              <a:rPr lang="en-US" sz="1400" dirty="0" smtClean="0">
+                <a:latin typeface="News Gothic Com Thin" panose="020B0204030503020204" pitchFamily="34" charset="0"/>
+                <a:cs typeface="News Gothic Com Thin" panose="020B0204030503020204" pitchFamily="34" charset="0"/>
+              </a:rPr>
+              <a:t>is </a:t>
+            </a:r>
+            <a:r>
+              <a:rPr lang="en-US" sz="1400" dirty="0" smtClean="0">
+                <a:latin typeface="News Gothic Com Thin" panose="020B0204030503020204" pitchFamily="34" charset="0"/>
+                <a:cs typeface="News Gothic Com Thin" panose="020B0204030503020204" pitchFamily="34" charset="0"/>
+              </a:rPr>
+              <a:t>glue"</a:t>
+            </a:r>
+            <a:endParaRPr lang="en-US" sz="1400" dirty="0" smtClean="0">
+              <a:latin typeface="News Gothic Com Thin" panose="020B0204030503020204" pitchFamily="34" charset="0"/>
+              <a:cs typeface="News Gothic Com Thin" panose="020B0204030503020204" pitchFamily="34" charset="0"/>
+            </a:endParaRPr>
           </a:p>
         </p:txBody>
       </p:sp>

</xml_diff>